<commit_message>
add Ooo. Ooos are coming !!!!!! and some # _ # you can see.
</commit_message>
<xml_diff>
--- a/panda_master/dat/deal_pic.pptx
+++ b/panda_master/dat/deal_pic.pptx
@@ -6,6 +6,7 @@
   </p:sldMasterIdLst>
   <p:sldIdLst>
     <p:sldId id="256" r:id="rId2"/>
+    <p:sldId id="257" r:id="rId3"/>
   </p:sldIdLst>
   <p:sldSz cx="12192000" cy="6858000"/>
   <p:notesSz cx="6858000" cy="9144000"/>
@@ -104,6 +105,11 @@
       </a:defRPr>
     </a:lvl9pPr>
   </p:defaultTextStyle>
+  <p:extLst>
+    <p:ext uri="{EFAFB233-063F-42B5-8137-9DF3F51BA10A}">
+      <p15:sldGuideLst xmlns:p15="http://schemas.microsoft.com/office/powerpoint/2012/main"/>
+    </p:ext>
+  </p:extLst>
 </p:presentation>
 </file>
 
@@ -254,7 +260,7 @@
           <a:p>
             <a:fld id="{A382DD69-BC81-437E-9316-AEF42C43C34A}" type="datetimeFigureOut">
               <a:rPr lang="zh-CN" altLang="en-US" smtClean="0"/>
-              <a:t>2024/9/29</a:t>
+              <a:t>2024/10/4</a:t>
             </a:fld>
             <a:endParaRPr lang="zh-CN" altLang="en-US"/>
           </a:p>
@@ -452,7 +458,7 @@
           <a:p>
             <a:fld id="{A382DD69-BC81-437E-9316-AEF42C43C34A}" type="datetimeFigureOut">
               <a:rPr lang="zh-CN" altLang="en-US" smtClean="0"/>
-              <a:t>2024/9/29</a:t>
+              <a:t>2024/10/4</a:t>
             </a:fld>
             <a:endParaRPr lang="zh-CN" altLang="en-US"/>
           </a:p>
@@ -660,7 +666,7 @@
           <a:p>
             <a:fld id="{A382DD69-BC81-437E-9316-AEF42C43C34A}" type="datetimeFigureOut">
               <a:rPr lang="zh-CN" altLang="en-US" smtClean="0"/>
-              <a:t>2024/9/29</a:t>
+              <a:t>2024/10/4</a:t>
             </a:fld>
             <a:endParaRPr lang="zh-CN" altLang="en-US"/>
           </a:p>
@@ -858,7 +864,7 @@
           <a:p>
             <a:fld id="{A382DD69-BC81-437E-9316-AEF42C43C34A}" type="datetimeFigureOut">
               <a:rPr lang="zh-CN" altLang="en-US" smtClean="0"/>
-              <a:t>2024/9/29</a:t>
+              <a:t>2024/10/4</a:t>
             </a:fld>
             <a:endParaRPr lang="zh-CN" altLang="en-US"/>
           </a:p>
@@ -1133,7 +1139,7 @@
           <a:p>
             <a:fld id="{A382DD69-BC81-437E-9316-AEF42C43C34A}" type="datetimeFigureOut">
               <a:rPr lang="zh-CN" altLang="en-US" smtClean="0"/>
-              <a:t>2024/9/29</a:t>
+              <a:t>2024/10/4</a:t>
             </a:fld>
             <a:endParaRPr lang="zh-CN" altLang="en-US"/>
           </a:p>
@@ -1398,7 +1404,7 @@
           <a:p>
             <a:fld id="{A382DD69-BC81-437E-9316-AEF42C43C34A}" type="datetimeFigureOut">
               <a:rPr lang="zh-CN" altLang="en-US" smtClean="0"/>
-              <a:t>2024/9/29</a:t>
+              <a:t>2024/10/4</a:t>
             </a:fld>
             <a:endParaRPr lang="zh-CN" altLang="en-US"/>
           </a:p>
@@ -1810,7 +1816,7 @@
           <a:p>
             <a:fld id="{A382DD69-BC81-437E-9316-AEF42C43C34A}" type="datetimeFigureOut">
               <a:rPr lang="zh-CN" altLang="en-US" smtClean="0"/>
-              <a:t>2024/9/29</a:t>
+              <a:t>2024/10/4</a:t>
             </a:fld>
             <a:endParaRPr lang="zh-CN" altLang="en-US"/>
           </a:p>
@@ -1951,7 +1957,7 @@
           <a:p>
             <a:fld id="{A382DD69-BC81-437E-9316-AEF42C43C34A}" type="datetimeFigureOut">
               <a:rPr lang="zh-CN" altLang="en-US" smtClean="0"/>
-              <a:t>2024/9/29</a:t>
+              <a:t>2024/10/4</a:t>
             </a:fld>
             <a:endParaRPr lang="zh-CN" altLang="en-US"/>
           </a:p>
@@ -2064,7 +2070,7 @@
           <a:p>
             <a:fld id="{A382DD69-BC81-437E-9316-AEF42C43C34A}" type="datetimeFigureOut">
               <a:rPr lang="zh-CN" altLang="en-US" smtClean="0"/>
-              <a:t>2024/9/29</a:t>
+              <a:t>2024/10/4</a:t>
             </a:fld>
             <a:endParaRPr lang="zh-CN" altLang="en-US"/>
           </a:p>
@@ -2375,7 +2381,7 @@
           <a:p>
             <a:fld id="{A382DD69-BC81-437E-9316-AEF42C43C34A}" type="datetimeFigureOut">
               <a:rPr lang="zh-CN" altLang="en-US" smtClean="0"/>
-              <a:t>2024/9/29</a:t>
+              <a:t>2024/10/4</a:t>
             </a:fld>
             <a:endParaRPr lang="zh-CN" altLang="en-US"/>
           </a:p>
@@ -2663,7 +2669,7 @@
           <a:p>
             <a:fld id="{A382DD69-BC81-437E-9316-AEF42C43C34A}" type="datetimeFigureOut">
               <a:rPr lang="zh-CN" altLang="en-US" smtClean="0"/>
-              <a:t>2024/9/29</a:t>
+              <a:t>2024/10/4</a:t>
             </a:fld>
             <a:endParaRPr lang="zh-CN" altLang="en-US"/>
           </a:p>
@@ -2904,7 +2910,7 @@
           <a:p>
             <a:fld id="{A382DD69-BC81-437E-9316-AEF42C43C34A}" type="datetimeFigureOut">
               <a:rPr lang="zh-CN" altLang="en-US" smtClean="0"/>
-              <a:t>2024/9/29</a:t>
+              <a:t>2024/10/4</a:t>
             </a:fld>
             <a:endParaRPr lang="zh-CN" altLang="en-US"/>
           </a:p>
@@ -3419,6 +3425,241 @@
 </p:sld>
 </file>
 
+<file path=ppt/slides/slide2.xml><?xml version="1.0" encoding="utf-8"?>
+<p:sld xmlns:a="http://schemas.openxmlformats.org/drawingml/2006/main" xmlns:r="http://schemas.openxmlformats.org/officeDocument/2006/relationships" xmlns:p="http://schemas.openxmlformats.org/presentationml/2006/main">
+  <p:cSld>
+    <p:spTree>
+      <p:nvGrpSpPr>
+        <p:cNvPr id="1" name=""/>
+        <p:cNvGrpSpPr/>
+        <p:nvPr/>
+      </p:nvGrpSpPr>
+      <p:grpSpPr>
+        <a:xfrm>
+          <a:off x="0" y="0"/>
+          <a:ext cx="0" cy="0"/>
+          <a:chOff x="0" y="0"/>
+          <a:chExt cx="0" cy="0"/>
+        </a:xfrm>
+      </p:grpSpPr>
+      <p:pic>
+        <p:nvPicPr>
+          <p:cNvPr id="5" name="图片 4">
+            <a:extLst>
+              <a:ext uri="{FF2B5EF4-FFF2-40B4-BE49-F238E27FC236}">
+                <a16:creationId xmlns:a16="http://schemas.microsoft.com/office/drawing/2014/main" id="{5AAD1B38-F7B5-196F-5E99-7B2F9F9D0F42}"/>
+              </a:ext>
+            </a:extLst>
+          </p:cNvPr>
+          <p:cNvPicPr>
+            <a:picLocks noChangeAspect="1"/>
+          </p:cNvPicPr>
+          <p:nvPr/>
+        </p:nvPicPr>
+        <p:blipFill>
+          <a:blip r:embed="rId2">
+            <a:clrChange>
+              <a:clrFrom>
+                <a:srgbClr val="F5FFFF"/>
+              </a:clrFrom>
+              <a:clrTo>
+                <a:srgbClr val="F5FFFF">
+                  <a:alpha val="0"/>
+                </a:srgbClr>
+              </a:clrTo>
+            </a:clrChange>
+            <a:duotone>
+              <a:schemeClr val="accent1">
+                <a:shade val="45000"/>
+                <a:satMod val="135000"/>
+              </a:schemeClr>
+              <a:prstClr val="white"/>
+            </a:duotone>
+            <a:extLst>
+              <a:ext uri="{28A0092B-C50C-407E-A947-70E740481C1C}">
+                <a14:useLocalDpi xmlns:a14="http://schemas.microsoft.com/office/drawing/2010/main" val="0"/>
+              </a:ext>
+            </a:extLst>
+          </a:blip>
+          <a:stretch>
+            <a:fillRect/>
+          </a:stretch>
+        </p:blipFill>
+        <p:spPr>
+          <a:xfrm>
+            <a:off x="4927872" y="3074102"/>
+            <a:ext cx="352474" cy="504895"/>
+          </a:xfrm>
+          <a:prstGeom prst="rect">
+            <a:avLst/>
+          </a:prstGeom>
+        </p:spPr>
+      </p:pic>
+      <p:pic>
+        <p:nvPicPr>
+          <p:cNvPr id="7" name="图片 6">
+            <a:extLst>
+              <a:ext uri="{FF2B5EF4-FFF2-40B4-BE49-F238E27FC236}">
+                <a16:creationId xmlns:a16="http://schemas.microsoft.com/office/drawing/2014/main" id="{A4E5CD7E-F5AA-7CA3-518B-4F286D61E3C2}"/>
+              </a:ext>
+            </a:extLst>
+          </p:cNvPr>
+          <p:cNvPicPr>
+            <a:picLocks noChangeAspect="1"/>
+          </p:cNvPicPr>
+          <p:nvPr/>
+        </p:nvPicPr>
+        <p:blipFill>
+          <a:blip r:embed="rId2">
+            <a:clrChange>
+              <a:clrFrom>
+                <a:srgbClr val="F9FFFF"/>
+              </a:clrFrom>
+              <a:clrTo>
+                <a:srgbClr val="F9FFFF">
+                  <a:alpha val="0"/>
+                </a:srgbClr>
+              </a:clrTo>
+            </a:clrChange>
+            <a:duotone>
+              <a:schemeClr val="accent6">
+                <a:shade val="45000"/>
+                <a:satMod val="135000"/>
+              </a:schemeClr>
+              <a:prstClr val="white"/>
+            </a:duotone>
+            <a:extLst>
+              <a:ext uri="{28A0092B-C50C-407E-A947-70E740481C1C}">
+                <a14:useLocalDpi xmlns:a14="http://schemas.microsoft.com/office/drawing/2010/main" val="0"/>
+              </a:ext>
+            </a:extLst>
+          </a:blip>
+          <a:stretch>
+            <a:fillRect/>
+          </a:stretch>
+        </p:blipFill>
+        <p:spPr>
+          <a:xfrm>
+            <a:off x="4420821" y="3074103"/>
+            <a:ext cx="352474" cy="504895"/>
+          </a:xfrm>
+          <a:prstGeom prst="rect">
+            <a:avLst/>
+          </a:prstGeom>
+        </p:spPr>
+      </p:pic>
+      <p:pic>
+        <p:nvPicPr>
+          <p:cNvPr id="9" name="图片 8">
+            <a:extLst>
+              <a:ext uri="{FF2B5EF4-FFF2-40B4-BE49-F238E27FC236}">
+                <a16:creationId xmlns:a16="http://schemas.microsoft.com/office/drawing/2014/main" id="{375A8041-8596-A7B1-9AF3-A8686671F3F2}"/>
+              </a:ext>
+            </a:extLst>
+          </p:cNvPr>
+          <p:cNvPicPr>
+            <a:picLocks noChangeAspect="1"/>
+          </p:cNvPicPr>
+          <p:nvPr/>
+        </p:nvPicPr>
+        <p:blipFill>
+          <a:blip r:embed="rId2">
+            <a:clrChange>
+              <a:clrFrom>
+                <a:srgbClr val="FDFDFD"/>
+              </a:clrFrom>
+              <a:clrTo>
+                <a:srgbClr val="FDFDFD">
+                  <a:alpha val="0"/>
+                </a:srgbClr>
+              </a:clrTo>
+            </a:clrChange>
+            <a:duotone>
+              <a:schemeClr val="accent2">
+                <a:shade val="45000"/>
+                <a:satMod val="135000"/>
+              </a:schemeClr>
+              <a:prstClr val="white"/>
+            </a:duotone>
+            <a:extLst>
+              <a:ext uri="{28A0092B-C50C-407E-A947-70E740481C1C}">
+                <a14:useLocalDpi xmlns:a14="http://schemas.microsoft.com/office/drawing/2010/main" val="0"/>
+              </a:ext>
+            </a:extLst>
+          </a:blip>
+          <a:stretch>
+            <a:fillRect/>
+          </a:stretch>
+        </p:blipFill>
+        <p:spPr>
+          <a:xfrm>
+            <a:off x="5457148" y="3074102"/>
+            <a:ext cx="352474" cy="504895"/>
+          </a:xfrm>
+          <a:prstGeom prst="rect">
+            <a:avLst/>
+          </a:prstGeom>
+        </p:spPr>
+      </p:pic>
+      <p:pic>
+        <p:nvPicPr>
+          <p:cNvPr id="10" name="图片 9">
+            <a:extLst>
+              <a:ext uri="{FF2B5EF4-FFF2-40B4-BE49-F238E27FC236}">
+                <a16:creationId xmlns:a16="http://schemas.microsoft.com/office/drawing/2014/main" id="{7C2D649F-367A-AAAE-C74B-49C2925670B2}"/>
+              </a:ext>
+            </a:extLst>
+          </p:cNvPr>
+          <p:cNvPicPr>
+            <a:picLocks noChangeAspect="1"/>
+          </p:cNvPicPr>
+          <p:nvPr/>
+        </p:nvPicPr>
+        <p:blipFill>
+          <a:blip r:embed="rId2">
+            <a:clrChange>
+              <a:clrFrom>
+                <a:srgbClr val="FDFDFD"/>
+              </a:clrFrom>
+              <a:clrTo>
+                <a:srgbClr val="FDFDFD">
+                  <a:alpha val="0"/>
+                </a:srgbClr>
+              </a:clrTo>
+            </a:clrChange>
+            <a:extLst>
+              <a:ext uri="{28A0092B-C50C-407E-A947-70E740481C1C}">
+                <a14:useLocalDpi xmlns:a14="http://schemas.microsoft.com/office/drawing/2010/main" val="0"/>
+              </a:ext>
+            </a:extLst>
+          </a:blip>
+          <a:stretch>
+            <a:fillRect/>
+          </a:stretch>
+        </p:blipFill>
+        <p:spPr>
+          <a:xfrm>
+            <a:off x="5885773" y="3074102"/>
+            <a:ext cx="352474" cy="504895"/>
+          </a:xfrm>
+          <a:prstGeom prst="rect">
+            <a:avLst/>
+          </a:prstGeom>
+        </p:spPr>
+      </p:pic>
+    </p:spTree>
+    <p:extLst>
+      <p:ext uri="{BB962C8B-B14F-4D97-AF65-F5344CB8AC3E}">
+        <p14:creationId xmlns:p14="http://schemas.microsoft.com/office/powerpoint/2010/main" val="951610911"/>
+      </p:ext>
+    </p:extLst>
+  </p:cSld>
+  <p:clrMapOvr>
+    <a:masterClrMapping/>
+  </p:clrMapOvr>
+</p:sld>
+</file>
+
 <file path=ppt/theme/theme1.xml><?xml version="1.0" encoding="utf-8"?>
 <a:theme xmlns:a="http://schemas.openxmlformats.org/drawingml/2006/main" name="Office 主题​​">
   <a:themeElements>

</xml_diff>

<commit_message>
update pictures for Oos. update computing method of Oos' x locations by adding ComputeFunc.py.
</commit_message>
<xml_diff>
--- a/panda_master/dat/deal_pic.pptx
+++ b/panda_master/dat/deal_pic.pptx
@@ -3469,13 +3469,48 @@
               </a:clrTo>
             </a:clrChange>
             <a:duotone>
-              <a:schemeClr val="accent1">
-                <a:shade val="45000"/>
-                <a:satMod val="135000"/>
-              </a:schemeClr>
-              <a:prstClr val="white"/>
+              <a:prstClr val="black"/>
+              <a:srgbClr val="5B9BD5">
+                <a:tint val="45000"/>
+                <a:satMod val="400000"/>
+              </a:srgbClr>
             </a:duotone>
             <a:extLst>
+              <a:ext uri="{BEBA8EAE-BF5A-486C-A8C5-ECC9F3942E4B}">
+                <a14:imgProps xmlns:a14="http://schemas.microsoft.com/office/drawing/2010/main">
+                  <a14:imgLayer r:embed="rId3">
+                    <a14:imgEffect>
+                      <a14:backgroundRemoval t="3774" b="94340" l="2703" r="91892">
+                        <a14:foregroundMark x1="59459" y1="7547" x2="59459" y2="7547"/>
+                        <a14:foregroundMark x1="56757" y1="47170" x2="56757" y2="56604"/>
+                        <a14:foregroundMark x1="56757" y1="22642" x2="56757" y2="47170"/>
+                        <a14:foregroundMark x1="56757" y1="13208" x2="56757" y2="22642"/>
+                        <a14:foregroundMark x1="56757" y1="9434" x2="56757" y2="13208"/>
+                        <a14:foregroundMark x1="48649" y1="15094" x2="48649" y2="15094"/>
+                        <a14:foregroundMark x1="37838" y1="54717" x2="43243" y2="66038"/>
+                        <a14:foregroundMark x1="64865" y1="96226" x2="64865" y2="96226"/>
+                        <a14:foregroundMark x1="27027" y1="3774" x2="27027" y2="3774"/>
+                        <a14:foregroundMark x1="16216" y1="13208" x2="16216" y2="13208"/>
+                        <a14:foregroundMark x1="81081" y1="45283" x2="81081" y2="45283"/>
+                        <a14:foregroundMark x1="89189" y1="50943" x2="89189" y2="50943"/>
+                        <a14:foregroundMark x1="83784" y1="81132" x2="83784" y2="81132"/>
+                        <a14:foregroundMark x1="86486" y1="86792" x2="86486" y2="86792"/>
+                        <a14:foregroundMark x1="81081" y1="15094" x2="81081" y2="15094"/>
+                        <a14:foregroundMark x1="91892" y1="20755" x2="91892" y2="20755"/>
+                        <a14:backgroundMark x1="89189" y1="9434" x2="89189" y2="9434"/>
+                        <a14:backgroundMark x1="97297" y1="22642" x2="97297" y2="22642"/>
+                        <a14:backgroundMark x1="78378" y1="13208" x2="78378" y2="13208"/>
+                        <a14:backgroundMark x1="81081" y1="47170" x2="81081" y2="47170"/>
+                        <a14:backgroundMark x1="89189" y1="79245" x2="89189" y2="79245"/>
+                        <a14:backgroundMark x1="86486" y1="81132" x2="86486" y2="81132"/>
+                      </a14:backgroundRemoval>
+                    </a14:imgEffect>
+                    <a14:imgEffect>
+                      <a14:saturation sat="0"/>
+                    </a14:imgEffect>
+                  </a14:imgLayer>
+                </a14:imgProps>
+              </a:ext>
               <a:ext uri="{28A0092B-C50C-407E-A947-70E740481C1C}">
                 <a14:useLocalDpi xmlns:a14="http://schemas.microsoft.com/office/drawing/2010/main" val="0"/>
               </a:ext>
@@ -3487,8 +3522,8 @@
         </p:blipFill>
         <p:spPr>
           <a:xfrm>
-            <a:off x="4927872" y="3074102"/>
-            <a:ext cx="352474" cy="504895"/>
+            <a:off x="7721872" y="1511932"/>
+            <a:ext cx="1584000" cy="2268987"/>
           </a:xfrm>
           <a:prstGeom prst="rect">
             <a:avLst/>
@@ -3510,7 +3545,7 @@
           <p:nvPr/>
         </p:nvPicPr>
         <p:blipFill>
-          <a:blip r:embed="rId2">
+          <a:blip r:embed="rId4">
             <a:clrChange>
               <a:clrFrom>
                 <a:srgbClr val="F9FFFF"/>
@@ -3522,13 +3557,49 @@
               </a:clrTo>
             </a:clrChange>
             <a:duotone>
-              <a:schemeClr val="accent6">
-                <a:shade val="45000"/>
-                <a:satMod val="135000"/>
-              </a:schemeClr>
-              <a:prstClr val="white"/>
+              <a:prstClr val="black"/>
+              <a:srgbClr val="70AD47">
+                <a:tint val="45000"/>
+                <a:satMod val="400000"/>
+              </a:srgbClr>
             </a:duotone>
             <a:extLst>
+              <a:ext uri="{BEBA8EAE-BF5A-486C-A8C5-ECC9F3942E4B}">
+                <a14:imgProps xmlns:a14="http://schemas.microsoft.com/office/drawing/2010/main">
+                  <a14:imgLayer r:embed="rId3">
+                    <a14:imgEffect>
+                      <a14:backgroundRemoval t="1887" b="94340" l="2703" r="89189">
+                        <a14:foregroundMark x1="70270" y1="7547" x2="70270" y2="7547"/>
+                        <a14:foregroundMark x1="62162" y1="9434" x2="62162" y2="9434"/>
+                        <a14:foregroundMark x1="59459" y1="18868" x2="59459" y2="18868"/>
+                        <a14:foregroundMark x1="43243" y1="18868" x2="43243" y2="18868"/>
+                        <a14:foregroundMark x1="59459" y1="33962" x2="59459" y2="33962"/>
+                        <a14:foregroundMark x1="48649" y1="35849" x2="48649" y2="35849"/>
+                        <a14:foregroundMark x1="67568" y1="24528" x2="67568" y2="24528"/>
+                        <a14:foregroundMark x1="59459" y1="49057" x2="59459" y2="49057"/>
+                        <a14:foregroundMark x1="62162" y1="60377" x2="62162" y2="60377"/>
+                        <a14:foregroundMark x1="35135" y1="45283" x2="35135" y2="45283"/>
+                        <a14:foregroundMark x1="37838" y1="58491" x2="37838" y2="58491"/>
+                        <a14:foregroundMark x1="67568" y1="98113" x2="67568" y2="98113"/>
+                        <a14:foregroundMark x1="27027" y1="1887" x2="27027" y2="1887"/>
+                        <a14:foregroundMark x1="16216" y1="13208" x2="16216" y2="13208"/>
+                        <a14:foregroundMark x1="83784" y1="22642" x2="83784" y2="22642"/>
+                        <a14:foregroundMark x1="81081" y1="15094" x2="81081" y2="15094"/>
+                        <a14:foregroundMark x1="81081" y1="45283" x2="81081" y2="45283"/>
+                        <a14:foregroundMark x1="89189" y1="50943" x2="89189" y2="50943"/>
+                        <a14:foregroundMark x1="78378" y1="81132" x2="78378" y2="81132"/>
+                        <a14:foregroundMark x1="86486" y1="86792" x2="86486" y2="86792"/>
+                      </a14:backgroundRemoval>
+                    </a14:imgEffect>
+                    <a14:imgEffect>
+                      <a14:colorTemperature colorTemp="8328"/>
+                    </a14:imgEffect>
+                    <a14:imgEffect>
+                      <a14:saturation sat="0"/>
+                    </a14:imgEffect>
+                  </a14:imgLayer>
+                </a14:imgProps>
+              </a:ext>
               <a:ext uri="{28A0092B-C50C-407E-A947-70E740481C1C}">
                 <a14:useLocalDpi xmlns:a14="http://schemas.microsoft.com/office/drawing/2010/main" val="0"/>
               </a:ext>
@@ -3540,8 +3611,8 @@
         </p:blipFill>
         <p:spPr>
           <a:xfrm>
-            <a:off x="4420821" y="3074103"/>
-            <a:ext cx="352474" cy="504895"/>
+            <a:off x="2608960" y="2016827"/>
+            <a:ext cx="1584000" cy="2268987"/>
           </a:xfrm>
           <a:prstGeom prst="rect">
             <a:avLst/>
@@ -3563,7 +3634,7 @@
           <p:nvPr/>
         </p:nvPicPr>
         <p:blipFill>
-          <a:blip r:embed="rId2">
+          <a:blip r:embed="rId5">
             <a:clrChange>
               <a:clrFrom>
                 <a:srgbClr val="FDFDFD"/>
@@ -3575,13 +3646,51 @@
               </a:clrTo>
             </a:clrChange>
             <a:duotone>
-              <a:schemeClr val="accent2">
-                <a:shade val="45000"/>
-                <a:satMod val="135000"/>
-              </a:schemeClr>
-              <a:prstClr val="white"/>
+              <a:prstClr val="black"/>
+              <a:srgbClr val="ED7D31">
+                <a:tint val="45000"/>
+                <a:satMod val="400000"/>
+              </a:srgbClr>
             </a:duotone>
             <a:extLst>
+              <a:ext uri="{BEBA8EAE-BF5A-486C-A8C5-ECC9F3942E4B}">
+                <a14:imgProps xmlns:a14="http://schemas.microsoft.com/office/drawing/2010/main">
+                  <a14:imgLayer r:embed="rId3">
+                    <a14:imgEffect>
+                      <a14:backgroundRemoval t="1887" b="92453" l="2703" r="91892">
+                        <a14:foregroundMark x1="59459" y1="9434" x2="59459" y2="9434"/>
+                        <a14:foregroundMark x1="51351" y1="11321" x2="51351" y2="11321"/>
+                        <a14:foregroundMark x1="27027" y1="3774" x2="27027" y2="3774"/>
+                        <a14:foregroundMark x1="18919" y1="11321" x2="18919" y2="11321"/>
+                        <a14:foregroundMark x1="67568" y1="92453" x2="67568" y2="92453"/>
+                        <a14:foregroundMark x1="86486" y1="22642" x2="86486" y2="22642"/>
+                        <a14:foregroundMark x1="81081" y1="16981" x2="81081" y2="16981"/>
+                        <a14:foregroundMark x1="81081" y1="45283" x2="81081" y2="45283"/>
+                        <a14:foregroundMark x1="89189" y1="50943" x2="89189" y2="50943"/>
+                        <a14:foregroundMark x1="78378" y1="79245" x2="78378" y2="79245"/>
+                        <a14:foregroundMark x1="81081" y1="81132" x2="81081" y2="81132"/>
+                        <a14:foregroundMark x1="89189" y1="86792" x2="89189" y2="86792"/>
+                        <a14:foregroundMark x1="75676" y1="22642" x2="91892" y2="20755"/>
+                        <a14:foregroundMark x1="56757" y1="1887" x2="56757" y2="1887"/>
+                        <a14:backgroundMark x1="27027" y1="13208" x2="27027" y2="13208"/>
+                        <a14:backgroundMark x1="21622" y1="9434" x2="21622" y2="9434"/>
+                        <a14:backgroundMark x1="97297" y1="33962" x2="97297" y2="33962"/>
+                        <a14:backgroundMark x1="94595" y1="24528" x2="94595" y2="24528"/>
+                        <a14:backgroundMark x1="78378" y1="18868" x2="78378" y2="18868"/>
+                        <a14:backgroundMark x1="86486" y1="24528" x2="86486" y2="24528"/>
+                        <a14:backgroundMark x1="83784" y1="47170" x2="83784" y2="47170"/>
+                        <a14:backgroundMark x1="78378" y1="77358" x2="78378" y2="77358"/>
+                      </a14:backgroundRemoval>
+                    </a14:imgEffect>
+                    <a14:imgEffect>
+                      <a14:colorTemperature colorTemp="9428"/>
+                    </a14:imgEffect>
+                    <a14:imgEffect>
+                      <a14:saturation sat="30000"/>
+                    </a14:imgEffect>
+                  </a14:imgLayer>
+                </a14:imgProps>
+              </a:ext>
               <a:ext uri="{28A0092B-C50C-407E-A947-70E740481C1C}">
                 <a14:useLocalDpi xmlns:a14="http://schemas.microsoft.com/office/drawing/2010/main" val="0"/>
               </a:ext>
@@ -3593,8 +3702,8 @@
         </p:blipFill>
         <p:spPr>
           <a:xfrm>
-            <a:off x="5457148" y="3074102"/>
-            <a:ext cx="352474" cy="504895"/>
+            <a:off x="4403048" y="3534407"/>
+            <a:ext cx="1584000" cy="2268987"/>
           </a:xfrm>
           <a:prstGeom prst="rect">
             <a:avLst/>
@@ -3616,7 +3725,7 @@
           <p:nvPr/>
         </p:nvPicPr>
         <p:blipFill>
-          <a:blip r:embed="rId2">
+          <a:blip r:embed="rId6">
             <a:clrChange>
               <a:clrFrom>
                 <a:srgbClr val="FDFDFD"/>
@@ -3628,6 +3737,38 @@
               </a:clrTo>
             </a:clrChange>
             <a:extLst>
+              <a:ext uri="{BEBA8EAE-BF5A-486C-A8C5-ECC9F3942E4B}">
+                <a14:imgProps xmlns:a14="http://schemas.microsoft.com/office/drawing/2010/main">
+                  <a14:imgLayer r:embed="rId3">
+                    <a14:imgEffect>
+                      <a14:backgroundRemoval t="3774" b="94340" l="2703" r="89189">
+                        <a14:foregroundMark x1="56757" y1="7547" x2="56757" y2="7547"/>
+                        <a14:foregroundMark x1="56757" y1="47170" x2="56757" y2="69811"/>
+                        <a14:foregroundMark x1="56757" y1="26415" x2="56757" y2="47170"/>
+                        <a14:foregroundMark x1="56757" y1="11321" x2="56757" y2="26415"/>
+                        <a14:foregroundMark x1="56757" y1="7547" x2="56757" y2="11321"/>
+                        <a14:foregroundMark x1="48649" y1="15094" x2="48649" y2="15094"/>
+                        <a14:foregroundMark x1="27027" y1="3774" x2="27027" y2="3774"/>
+                        <a14:foregroundMark x1="16216" y1="13208" x2="16216" y2="13208"/>
+                        <a14:foregroundMark x1="59459" y1="88679" x2="59459" y2="88679"/>
+                        <a14:foregroundMark x1="67568" y1="96226" x2="67568" y2="96226"/>
+                        <a14:foregroundMark x1="83784" y1="86792" x2="83784" y2="86792"/>
+                        <a14:foregroundMark x1="78378" y1="45283" x2="78378" y2="45283"/>
+                        <a14:foregroundMark x1="86486" y1="50943" x2="86486" y2="50943"/>
+                        <a14:foregroundMark x1="81081" y1="15094" x2="81081" y2="15094"/>
+                        <a14:foregroundMark x1="83784" y1="24528" x2="83784" y2="24528"/>
+                        <a14:foregroundMark x1="89189" y1="22642" x2="89189" y2="22642"/>
+                        <a14:foregroundMark x1="81081" y1="79245" x2="81081" y2="79245"/>
+                        <a14:backgroundMark x1="81081" y1="47170" x2="81081" y2="47170"/>
+                        <a14:backgroundMark x1="91892" y1="26415" x2="91892" y2="26415"/>
+                        <a14:backgroundMark x1="86486" y1="26415" x2="86486" y2="26415"/>
+                        <a14:backgroundMark x1="78378" y1="11321" x2="78378" y2="11321"/>
+                        <a14:backgroundMark x1="81081" y1="75472" x2="81081" y2="75472"/>
+                      </a14:backgroundRemoval>
+                    </a14:imgEffect>
+                  </a14:imgLayer>
+                </a14:imgProps>
+              </a:ext>
               <a:ext uri="{28A0092B-C50C-407E-A947-70E740481C1C}">
                 <a14:useLocalDpi xmlns:a14="http://schemas.microsoft.com/office/drawing/2010/main" val="0"/>
               </a:ext>
@@ -3639,8 +3780,8 @@
         </p:blipFill>
         <p:spPr>
           <a:xfrm>
-            <a:off x="5885773" y="3074102"/>
-            <a:ext cx="352474" cy="504895"/>
+            <a:off x="7168473" y="4039302"/>
+            <a:ext cx="1584000" cy="2268987"/>
           </a:xfrm>
           <a:prstGeom prst="rect">
             <a:avLst/>

</xml_diff>

<commit_message>
optimize the pic of panda when it is killing, and test adding the speed of addoos.
</commit_message>
<xml_diff>
--- a/panda_master/dat/deal_pic.pptx
+++ b/panda_master/dat/deal_pic.pptx
@@ -260,7 +260,7 @@
           <a:p>
             <a:fld id="{A382DD69-BC81-437E-9316-AEF42C43C34A}" type="datetimeFigureOut">
               <a:rPr lang="zh-CN" altLang="en-US" smtClean="0"/>
-              <a:t>2024/10/4</a:t>
+              <a:t>2024/10/5</a:t>
             </a:fld>
             <a:endParaRPr lang="zh-CN" altLang="en-US"/>
           </a:p>
@@ -458,7 +458,7 @@
           <a:p>
             <a:fld id="{A382DD69-BC81-437E-9316-AEF42C43C34A}" type="datetimeFigureOut">
               <a:rPr lang="zh-CN" altLang="en-US" smtClean="0"/>
-              <a:t>2024/10/4</a:t>
+              <a:t>2024/10/5</a:t>
             </a:fld>
             <a:endParaRPr lang="zh-CN" altLang="en-US"/>
           </a:p>
@@ -666,7 +666,7 @@
           <a:p>
             <a:fld id="{A382DD69-BC81-437E-9316-AEF42C43C34A}" type="datetimeFigureOut">
               <a:rPr lang="zh-CN" altLang="en-US" smtClean="0"/>
-              <a:t>2024/10/4</a:t>
+              <a:t>2024/10/5</a:t>
             </a:fld>
             <a:endParaRPr lang="zh-CN" altLang="en-US"/>
           </a:p>
@@ -864,7 +864,7 @@
           <a:p>
             <a:fld id="{A382DD69-BC81-437E-9316-AEF42C43C34A}" type="datetimeFigureOut">
               <a:rPr lang="zh-CN" altLang="en-US" smtClean="0"/>
-              <a:t>2024/10/4</a:t>
+              <a:t>2024/10/5</a:t>
             </a:fld>
             <a:endParaRPr lang="zh-CN" altLang="en-US"/>
           </a:p>
@@ -1139,7 +1139,7 @@
           <a:p>
             <a:fld id="{A382DD69-BC81-437E-9316-AEF42C43C34A}" type="datetimeFigureOut">
               <a:rPr lang="zh-CN" altLang="en-US" smtClean="0"/>
-              <a:t>2024/10/4</a:t>
+              <a:t>2024/10/5</a:t>
             </a:fld>
             <a:endParaRPr lang="zh-CN" altLang="en-US"/>
           </a:p>
@@ -1404,7 +1404,7 @@
           <a:p>
             <a:fld id="{A382DD69-BC81-437E-9316-AEF42C43C34A}" type="datetimeFigureOut">
               <a:rPr lang="zh-CN" altLang="en-US" smtClean="0"/>
-              <a:t>2024/10/4</a:t>
+              <a:t>2024/10/5</a:t>
             </a:fld>
             <a:endParaRPr lang="zh-CN" altLang="en-US"/>
           </a:p>
@@ -1816,7 +1816,7 @@
           <a:p>
             <a:fld id="{A382DD69-BC81-437E-9316-AEF42C43C34A}" type="datetimeFigureOut">
               <a:rPr lang="zh-CN" altLang="en-US" smtClean="0"/>
-              <a:t>2024/10/4</a:t>
+              <a:t>2024/10/5</a:t>
             </a:fld>
             <a:endParaRPr lang="zh-CN" altLang="en-US"/>
           </a:p>
@@ -1957,7 +1957,7 @@
           <a:p>
             <a:fld id="{A382DD69-BC81-437E-9316-AEF42C43C34A}" type="datetimeFigureOut">
               <a:rPr lang="zh-CN" altLang="en-US" smtClean="0"/>
-              <a:t>2024/10/4</a:t>
+              <a:t>2024/10/5</a:t>
             </a:fld>
             <a:endParaRPr lang="zh-CN" altLang="en-US"/>
           </a:p>
@@ -2070,7 +2070,7 @@
           <a:p>
             <a:fld id="{A382DD69-BC81-437E-9316-AEF42C43C34A}" type="datetimeFigureOut">
               <a:rPr lang="zh-CN" altLang="en-US" smtClean="0"/>
-              <a:t>2024/10/4</a:t>
+              <a:t>2024/10/5</a:t>
             </a:fld>
             <a:endParaRPr lang="zh-CN" altLang="en-US"/>
           </a:p>
@@ -2381,7 +2381,7 @@
           <a:p>
             <a:fld id="{A382DD69-BC81-437E-9316-AEF42C43C34A}" type="datetimeFigureOut">
               <a:rPr lang="zh-CN" altLang="en-US" smtClean="0"/>
-              <a:t>2024/10/4</a:t>
+              <a:t>2024/10/5</a:t>
             </a:fld>
             <a:endParaRPr lang="zh-CN" altLang="en-US"/>
           </a:p>
@@ -2669,7 +2669,7 @@
           <a:p>
             <a:fld id="{A382DD69-BC81-437E-9316-AEF42C43C34A}" type="datetimeFigureOut">
               <a:rPr lang="zh-CN" altLang="en-US" smtClean="0"/>
-              <a:t>2024/10/4</a:t>
+              <a:t>2024/10/5</a:t>
             </a:fld>
             <a:endParaRPr lang="zh-CN" altLang="en-US"/>
           </a:p>
@@ -2910,7 +2910,7 @@
           <a:p>
             <a:fld id="{A382DD69-BC81-437E-9316-AEF42C43C34A}" type="datetimeFigureOut">
               <a:rPr lang="zh-CN" altLang="en-US" smtClean="0"/>
-              <a:t>2024/10/4</a:t>
+              <a:t>2024/10/5</a:t>
             </a:fld>
             <a:endParaRPr lang="zh-CN" altLang="en-US"/>
           </a:p>
@@ -3368,7 +3368,7 @@
         </p:blipFill>
         <p:spPr>
           <a:xfrm>
-            <a:off x="5505450" y="2800350"/>
+            <a:off x="1954530" y="1390515"/>
             <a:ext cx="519725" cy="628650"/>
           </a:xfrm>
           <a:prstGeom prst="rect">
@@ -3378,10 +3378,10 @@
       </p:pic>
       <p:pic>
         <p:nvPicPr>
-          <p:cNvPr id="7" name="图片 6">
-            <a:extLst>
-              <a:ext uri="{FF2B5EF4-FFF2-40B4-BE49-F238E27FC236}">
-                <a16:creationId xmlns:a16="http://schemas.microsoft.com/office/drawing/2014/main" id="{BCE7B7BE-914C-1B5A-E7B5-1A89586276C7}"/>
+          <p:cNvPr id="3" name="图片 2">
+            <a:extLst>
+              <a:ext uri="{FF2B5EF4-FFF2-40B4-BE49-F238E27FC236}">
+                <a16:creationId xmlns:a16="http://schemas.microsoft.com/office/drawing/2014/main" id="{318C7E5F-2316-0987-7DBD-CA17DAB185BB}"/>
               </a:ext>
             </a:extLst>
           </p:cNvPr>
@@ -3404,8 +3404,507 @@
         </p:blipFill>
         <p:spPr>
           <a:xfrm>
-            <a:off x="6586501" y="3173595"/>
+            <a:off x="2596175" y="1390427"/>
             <a:ext cx="523948" cy="628738"/>
+          </a:xfrm>
+          <a:prstGeom prst="rect">
+            <a:avLst/>
+          </a:prstGeom>
+        </p:spPr>
+      </p:pic>
+      <p:grpSp>
+        <p:nvGrpSpPr>
+          <p:cNvPr id="22" name="组合 21">
+            <a:extLst>
+              <a:ext uri="{FF2B5EF4-FFF2-40B4-BE49-F238E27FC236}">
+                <a16:creationId xmlns:a16="http://schemas.microsoft.com/office/drawing/2014/main" id="{2E15113A-ABB3-9AFC-9610-DF8841CB5063}"/>
+              </a:ext>
+            </a:extLst>
+          </p:cNvPr>
+          <p:cNvGrpSpPr/>
+          <p:nvPr/>
+        </p:nvGrpSpPr>
+        <p:grpSpPr>
+          <a:xfrm>
+            <a:off x="3242043" y="1421357"/>
+            <a:ext cx="594432" cy="566877"/>
+            <a:chOff x="3242043" y="1421357"/>
+            <a:chExt cx="594432" cy="566877"/>
+          </a:xfrm>
+        </p:grpSpPr>
+        <p:cxnSp>
+          <p:nvCxnSpPr>
+            <p:cNvPr id="20" name="直接连接符 19">
+              <a:extLst>
+                <a:ext uri="{FF2B5EF4-FFF2-40B4-BE49-F238E27FC236}">
+                  <a16:creationId xmlns:a16="http://schemas.microsoft.com/office/drawing/2014/main" id="{94790E32-C731-FE69-F37E-35555435C9E7}"/>
+                </a:ext>
+              </a:extLst>
+            </p:cNvPr>
+            <p:cNvCxnSpPr/>
+            <p:nvPr/>
+          </p:nvCxnSpPr>
+          <p:spPr>
+            <a:xfrm>
+              <a:off x="3351917" y="1783364"/>
+              <a:ext cx="324000" cy="0"/>
+            </a:xfrm>
+            <a:prstGeom prst="line">
+              <a:avLst/>
+            </a:prstGeom>
+            <a:ln w="28575">
+              <a:solidFill>
+                <a:schemeClr val="bg1"/>
+              </a:solidFill>
+            </a:ln>
+          </p:spPr>
+          <p:style>
+            <a:lnRef idx="1">
+              <a:schemeClr val="accent1"/>
+            </a:lnRef>
+            <a:fillRef idx="0">
+              <a:schemeClr val="accent1"/>
+            </a:fillRef>
+            <a:effectRef idx="0">
+              <a:schemeClr val="accent1"/>
+            </a:effectRef>
+            <a:fontRef idx="minor">
+              <a:schemeClr val="tx1"/>
+            </a:fontRef>
+          </p:style>
+        </p:cxnSp>
+        <p:cxnSp>
+          <p:nvCxnSpPr>
+            <p:cNvPr id="21" name="直接连接符 20">
+              <a:extLst>
+                <a:ext uri="{FF2B5EF4-FFF2-40B4-BE49-F238E27FC236}">
+                  <a16:creationId xmlns:a16="http://schemas.microsoft.com/office/drawing/2014/main" id="{731D9CA2-4E47-D2D2-8E2D-1E4AC468DAC1}"/>
+                </a:ext>
+              </a:extLst>
+            </p:cNvPr>
+            <p:cNvCxnSpPr/>
+            <p:nvPr/>
+          </p:nvCxnSpPr>
+          <p:spPr>
+            <a:xfrm>
+              <a:off x="3320960" y="1864327"/>
+              <a:ext cx="252000" cy="0"/>
+            </a:xfrm>
+            <a:prstGeom prst="line">
+              <a:avLst/>
+            </a:prstGeom>
+            <a:ln w="28575">
+              <a:solidFill>
+                <a:schemeClr val="bg1"/>
+              </a:solidFill>
+            </a:ln>
+          </p:spPr>
+          <p:style>
+            <a:lnRef idx="1">
+              <a:schemeClr val="accent1"/>
+            </a:lnRef>
+            <a:fillRef idx="0">
+              <a:schemeClr val="accent1"/>
+            </a:fillRef>
+            <a:effectRef idx="0">
+              <a:schemeClr val="accent1"/>
+            </a:effectRef>
+            <a:fontRef idx="minor">
+              <a:schemeClr val="tx1"/>
+            </a:fontRef>
+          </p:style>
+        </p:cxnSp>
+        <p:grpSp>
+          <p:nvGrpSpPr>
+            <p:cNvPr id="18" name="组合 17">
+              <a:extLst>
+                <a:ext uri="{FF2B5EF4-FFF2-40B4-BE49-F238E27FC236}">
+                  <a16:creationId xmlns:a16="http://schemas.microsoft.com/office/drawing/2014/main" id="{C3EB9599-610E-371A-1C87-EE8DA1707253}"/>
+                </a:ext>
+              </a:extLst>
+            </p:cNvPr>
+            <p:cNvGrpSpPr/>
+            <p:nvPr/>
+          </p:nvGrpSpPr>
+          <p:grpSpPr>
+            <a:xfrm>
+              <a:off x="3242043" y="1421357"/>
+              <a:ext cx="594432" cy="566877"/>
+              <a:chOff x="4895511" y="2198235"/>
+              <a:chExt cx="594432" cy="566877"/>
+            </a:xfrm>
+          </p:grpSpPr>
+          <p:pic>
+            <p:nvPicPr>
+              <p:cNvPr id="7" name="图片 6">
+                <a:extLst>
+                  <a:ext uri="{FF2B5EF4-FFF2-40B4-BE49-F238E27FC236}">
+                    <a16:creationId xmlns:a16="http://schemas.microsoft.com/office/drawing/2014/main" id="{BCE7B7BE-914C-1B5A-E7B5-1A89586276C7}"/>
+                  </a:ext>
+                </a:extLst>
+              </p:cNvPr>
+              <p:cNvPicPr>
+                <a:picLocks noChangeAspect="1"/>
+              </p:cNvPicPr>
+              <p:nvPr/>
+            </p:nvPicPr>
+            <p:blipFill>
+              <a:blip r:embed="rId4">
+                <a:extLst>
+                  <a:ext uri="{28A0092B-C50C-407E-A947-70E740481C1C}">
+                    <a14:useLocalDpi xmlns:a14="http://schemas.microsoft.com/office/drawing/2010/main" val="0"/>
+                  </a:ext>
+                </a:extLst>
+              </a:blip>
+              <a:srcRect b="41288"/>
+              <a:stretch/>
+            </p:blipFill>
+            <p:spPr>
+              <a:xfrm>
+                <a:off x="4965995" y="2198235"/>
+                <a:ext cx="523948" cy="346845"/>
+              </a:xfrm>
+              <a:prstGeom prst="rect">
+                <a:avLst/>
+              </a:prstGeom>
+            </p:spPr>
+          </p:pic>
+          <p:pic>
+            <p:nvPicPr>
+              <p:cNvPr id="2" name="图片 1">
+                <a:extLst>
+                  <a:ext uri="{FF2B5EF4-FFF2-40B4-BE49-F238E27FC236}">
+                    <a16:creationId xmlns:a16="http://schemas.microsoft.com/office/drawing/2014/main" id="{D4B84953-9E68-EE4D-3B7B-B95F902D046B}"/>
+                  </a:ext>
+                </a:extLst>
+              </p:cNvPr>
+              <p:cNvPicPr>
+                <a:picLocks noChangeAspect="1"/>
+              </p:cNvPicPr>
+              <p:nvPr/>
+            </p:nvPicPr>
+            <p:blipFill>
+              <a:blip r:embed="rId4">
+                <a:extLst>
+                  <a:ext uri="{28A0092B-C50C-407E-A947-70E740481C1C}">
+                    <a14:useLocalDpi xmlns:a14="http://schemas.microsoft.com/office/drawing/2010/main" val="0"/>
+                  </a:ext>
+                </a:extLst>
+              </a:blip>
+              <a:srcRect t="74557" b="-1"/>
+              <a:stretch/>
+            </p:blipFill>
+            <p:spPr>
+              <a:xfrm>
+                <a:off x="4895511" y="2643191"/>
+                <a:ext cx="523948" cy="121921"/>
+              </a:xfrm>
+              <a:prstGeom prst="rect">
+                <a:avLst/>
+              </a:prstGeom>
+            </p:spPr>
+          </p:pic>
+          <p:pic>
+            <p:nvPicPr>
+              <p:cNvPr id="4" name="图片 3">
+                <a:extLst>
+                  <a:ext uri="{FF2B5EF4-FFF2-40B4-BE49-F238E27FC236}">
+                    <a16:creationId xmlns:a16="http://schemas.microsoft.com/office/drawing/2014/main" id="{F1154FDC-B98A-D168-E4FE-03959D918C8F}"/>
+                  </a:ext>
+                </a:extLst>
+              </p:cNvPr>
+              <p:cNvPicPr>
+                <a:picLocks noChangeAspect="1"/>
+              </p:cNvPicPr>
+              <p:nvPr/>
+            </p:nvPicPr>
+            <p:blipFill>
+              <a:blip r:embed="rId4">
+                <a:extLst>
+                  <a:ext uri="{28A0092B-C50C-407E-A947-70E740481C1C}">
+                    <a14:useLocalDpi xmlns:a14="http://schemas.microsoft.com/office/drawing/2010/main" val="0"/>
+                  </a:ext>
+                </a:extLst>
+              </a:blip>
+              <a:srcRect t="60436" b="25443"/>
+              <a:stretch/>
+            </p:blipFill>
+            <p:spPr>
+              <a:xfrm>
+                <a:off x="4939804" y="2559844"/>
+                <a:ext cx="485848" cy="71439"/>
+              </a:xfrm>
+              <a:prstGeom prst="rect">
+                <a:avLst/>
+              </a:prstGeom>
+            </p:spPr>
+          </p:pic>
+          <p:cxnSp>
+            <p:nvCxnSpPr>
+              <p:cNvPr id="8" name="直接连接符 7">
+                <a:extLst>
+                  <a:ext uri="{FF2B5EF4-FFF2-40B4-BE49-F238E27FC236}">
+                    <a16:creationId xmlns:a16="http://schemas.microsoft.com/office/drawing/2014/main" id="{B9D23676-DD7C-AA5C-5AE6-D6DDBA63B10A}"/>
+                  </a:ext>
+                </a:extLst>
+              </p:cNvPr>
+              <p:cNvCxnSpPr>
+                <a:stCxn id="4" idx="1"/>
+                <a:endCxn id="4" idx="1"/>
+              </p:cNvCxnSpPr>
+              <p:nvPr/>
+            </p:nvCxnSpPr>
+            <p:spPr>
+              <a:xfrm>
+                <a:off x="4939804" y="2595564"/>
+                <a:ext cx="0" cy="0"/>
+              </a:xfrm>
+              <a:prstGeom prst="line">
+                <a:avLst/>
+              </a:prstGeom>
+            </p:spPr>
+            <p:style>
+              <a:lnRef idx="1">
+                <a:schemeClr val="accent1"/>
+              </a:lnRef>
+              <a:fillRef idx="0">
+                <a:schemeClr val="accent1"/>
+              </a:fillRef>
+              <a:effectRef idx="0">
+                <a:schemeClr val="accent1"/>
+              </a:effectRef>
+              <a:fontRef idx="minor">
+                <a:schemeClr val="tx1"/>
+              </a:fontRef>
+            </p:style>
+          </p:cxnSp>
+          <p:cxnSp>
+            <p:nvCxnSpPr>
+              <p:cNvPr id="10" name="直接连接符 9">
+                <a:extLst>
+                  <a:ext uri="{FF2B5EF4-FFF2-40B4-BE49-F238E27FC236}">
+                    <a16:creationId xmlns:a16="http://schemas.microsoft.com/office/drawing/2014/main" id="{EE00672D-2BEE-A636-EFA9-3CBC645C0BEC}"/>
+                  </a:ext>
+                </a:extLst>
+              </p:cNvPr>
+              <p:cNvCxnSpPr/>
+              <p:nvPr/>
+            </p:nvCxnSpPr>
+            <p:spPr>
+              <a:xfrm flipV="1">
+                <a:off x="4997453" y="2530476"/>
+                <a:ext cx="33337" cy="30957"/>
+              </a:xfrm>
+              <a:prstGeom prst="line">
+                <a:avLst/>
+              </a:prstGeom>
+              <a:ln w="9525">
+                <a:solidFill>
+                  <a:schemeClr val="tx1">
+                    <a:lumMod val="50000"/>
+                    <a:lumOff val="50000"/>
+                  </a:schemeClr>
+                </a:solidFill>
+              </a:ln>
+              <a:effectLst>
+                <a:outerShdw blurRad="127000" dir="5400000" sx="48000" sy="48000" algn="t" rotWithShape="0">
+                  <a:prstClr val="black"/>
+                </a:outerShdw>
+              </a:effectLst>
+            </p:spPr>
+            <p:style>
+              <a:lnRef idx="1">
+                <a:schemeClr val="dk1"/>
+              </a:lnRef>
+              <a:fillRef idx="0">
+                <a:schemeClr val="dk1"/>
+              </a:fillRef>
+              <a:effectRef idx="0">
+                <a:schemeClr val="dk1"/>
+              </a:effectRef>
+              <a:fontRef idx="minor">
+                <a:schemeClr val="tx1"/>
+              </a:fontRef>
+            </p:style>
+          </p:cxnSp>
+          <p:cxnSp>
+            <p:nvCxnSpPr>
+              <p:cNvPr id="11" name="直接连接符 10">
+                <a:extLst>
+                  <a:ext uri="{FF2B5EF4-FFF2-40B4-BE49-F238E27FC236}">
+                    <a16:creationId xmlns:a16="http://schemas.microsoft.com/office/drawing/2014/main" id="{E2315140-6DD8-36C8-80DC-C227C04717EE}"/>
+                  </a:ext>
+                </a:extLst>
+              </p:cNvPr>
+              <p:cNvCxnSpPr/>
+              <p:nvPr/>
+            </p:nvCxnSpPr>
+            <p:spPr>
+              <a:xfrm flipV="1">
+                <a:off x="5333214" y="2537621"/>
+                <a:ext cx="33337" cy="30957"/>
+              </a:xfrm>
+              <a:prstGeom prst="line">
+                <a:avLst/>
+              </a:prstGeom>
+              <a:ln w="9525">
+                <a:solidFill>
+                  <a:schemeClr val="tx1">
+                    <a:lumMod val="50000"/>
+                    <a:lumOff val="50000"/>
+                  </a:schemeClr>
+                </a:solidFill>
+              </a:ln>
+              <a:effectLst>
+                <a:outerShdw blurRad="127000" dir="5400000" sx="48000" sy="48000" algn="t" rotWithShape="0">
+                  <a:prstClr val="black"/>
+                </a:outerShdw>
+              </a:effectLst>
+            </p:spPr>
+            <p:style>
+              <a:lnRef idx="1">
+                <a:schemeClr val="dk1"/>
+              </a:lnRef>
+              <a:fillRef idx="0">
+                <a:schemeClr val="dk1"/>
+              </a:fillRef>
+              <a:effectRef idx="0">
+                <a:schemeClr val="dk1"/>
+              </a:effectRef>
+              <a:fontRef idx="minor">
+                <a:schemeClr val="tx1"/>
+              </a:fontRef>
+            </p:style>
+          </p:cxnSp>
+          <p:cxnSp>
+            <p:nvCxnSpPr>
+              <p:cNvPr id="12" name="直接连接符 11">
+                <a:extLst>
+                  <a:ext uri="{FF2B5EF4-FFF2-40B4-BE49-F238E27FC236}">
+                    <a16:creationId xmlns:a16="http://schemas.microsoft.com/office/drawing/2014/main" id="{FD3BC2AA-1363-0D51-7277-E605596A10C4}"/>
+                  </a:ext>
+                </a:extLst>
+              </p:cNvPr>
+              <p:cNvCxnSpPr/>
+              <p:nvPr/>
+            </p:nvCxnSpPr>
+            <p:spPr>
+              <a:xfrm flipV="1">
+                <a:off x="4952207" y="2616200"/>
+                <a:ext cx="33337" cy="30957"/>
+              </a:xfrm>
+              <a:prstGeom prst="line">
+                <a:avLst/>
+              </a:prstGeom>
+              <a:ln w="9525">
+                <a:solidFill>
+                  <a:schemeClr val="tx1">
+                    <a:lumMod val="50000"/>
+                    <a:lumOff val="50000"/>
+                  </a:schemeClr>
+                </a:solidFill>
+              </a:ln>
+              <a:effectLst>
+                <a:outerShdw blurRad="127000" dir="5400000" sx="48000" sy="48000" algn="t" rotWithShape="0">
+                  <a:prstClr val="black"/>
+                </a:outerShdw>
+              </a:effectLst>
+            </p:spPr>
+            <p:style>
+              <a:lnRef idx="1">
+                <a:schemeClr val="dk1"/>
+              </a:lnRef>
+              <a:fillRef idx="0">
+                <a:schemeClr val="dk1"/>
+              </a:fillRef>
+              <a:effectRef idx="0">
+                <a:schemeClr val="dk1"/>
+              </a:effectRef>
+              <a:fontRef idx="minor">
+                <a:schemeClr val="tx1"/>
+              </a:fontRef>
+            </p:style>
+          </p:cxnSp>
+          <p:cxnSp>
+            <p:nvCxnSpPr>
+              <p:cNvPr id="17" name="直接连接符 16">
+                <a:extLst>
+                  <a:ext uri="{FF2B5EF4-FFF2-40B4-BE49-F238E27FC236}">
+                    <a16:creationId xmlns:a16="http://schemas.microsoft.com/office/drawing/2014/main" id="{0A93115E-0FD5-0DC8-A206-4970DB5C9335}"/>
+                  </a:ext>
+                </a:extLst>
+              </p:cNvPr>
+              <p:cNvCxnSpPr/>
+              <p:nvPr/>
+            </p:nvCxnSpPr>
+            <p:spPr>
+              <a:xfrm>
+                <a:off x="5236367" y="2636041"/>
+                <a:ext cx="144000" cy="0"/>
+              </a:xfrm>
+              <a:prstGeom prst="line">
+                <a:avLst/>
+              </a:prstGeom>
+              <a:ln w="19050">
+                <a:solidFill>
+                  <a:schemeClr val="tx1">
+                    <a:lumMod val="75000"/>
+                    <a:lumOff val="25000"/>
+                  </a:schemeClr>
+                </a:solidFill>
+              </a:ln>
+              <a:effectLst>
+                <a:outerShdw blurRad="127000" dir="5400000" sx="48000" sy="48000" algn="t" rotWithShape="0">
+                  <a:prstClr val="black"/>
+                </a:outerShdw>
+              </a:effectLst>
+            </p:spPr>
+            <p:style>
+              <a:lnRef idx="1">
+                <a:schemeClr val="dk1"/>
+              </a:lnRef>
+              <a:fillRef idx="0">
+                <a:schemeClr val="dk1"/>
+              </a:fillRef>
+              <a:effectRef idx="0">
+                <a:schemeClr val="dk1"/>
+              </a:effectRef>
+              <a:fontRef idx="minor">
+                <a:schemeClr val="tx1"/>
+              </a:fontRef>
+            </p:style>
+          </p:cxnSp>
+        </p:grpSp>
+      </p:grpSp>
+      <p:pic>
+        <p:nvPicPr>
+          <p:cNvPr id="24" name="图片 23">
+            <a:extLst>
+              <a:ext uri="{FF2B5EF4-FFF2-40B4-BE49-F238E27FC236}">
+                <a16:creationId xmlns:a16="http://schemas.microsoft.com/office/drawing/2014/main" id="{81956E48-9BBA-1C31-FF83-0053397F28C4}"/>
+              </a:ext>
+            </a:extLst>
+          </p:cNvPr>
+          <p:cNvPicPr>
+            <a:picLocks noChangeAspect="1"/>
+          </p:cNvPicPr>
+          <p:nvPr/>
+        </p:nvPicPr>
+        <p:blipFill>
+          <a:blip r:embed="rId5">
+            <a:extLst>
+              <a:ext uri="{28A0092B-C50C-407E-A947-70E740481C1C}">
+                <a14:useLocalDpi xmlns:a14="http://schemas.microsoft.com/office/drawing/2010/main" val="0"/>
+              </a:ext>
+            </a:extLst>
+          </a:blip>
+          <a:srcRect l="15598" t="1" r="5088" b="1245"/>
+          <a:stretch/>
+        </p:blipFill>
+        <p:spPr>
+          <a:xfrm>
+            <a:off x="5480049" y="2475713"/>
+            <a:ext cx="527051" cy="565937"/>
           </a:xfrm>
           <a:prstGeom prst="rect">
             <a:avLst/>

</xml_diff>

<commit_message>
set score and killnum, and set 'paused' method by key.space. And change the pic of wall.
</commit_message>
<xml_diff>
--- a/panda_master/dat/deal_pic.pptx
+++ b/panda_master/dat/deal_pic.pptx
@@ -7,6 +7,7 @@
   <p:sldIdLst>
     <p:sldId id="256" r:id="rId2"/>
     <p:sldId id="257" r:id="rId3"/>
+    <p:sldId id="258" r:id="rId4"/>
   </p:sldIdLst>
   <p:sldSz cx="12192000" cy="6858000"/>
   <p:notesSz cx="6858000" cy="9144000"/>
@@ -4300,6 +4301,137 @@
 </p:sld>
 </file>
 
+<file path=ppt/slides/slide3.xml><?xml version="1.0" encoding="utf-8"?>
+<p:sld xmlns:a="http://schemas.openxmlformats.org/drawingml/2006/main" xmlns:r="http://schemas.openxmlformats.org/officeDocument/2006/relationships" xmlns:p="http://schemas.openxmlformats.org/presentationml/2006/main">
+  <p:cSld>
+    <p:spTree>
+      <p:nvGrpSpPr>
+        <p:cNvPr id="1" name=""/>
+        <p:cNvGrpSpPr/>
+        <p:nvPr/>
+      </p:nvGrpSpPr>
+      <p:grpSpPr>
+        <a:xfrm>
+          <a:off x="0" y="0"/>
+          <a:ext cx="0" cy="0"/>
+          <a:chOff x="0" y="0"/>
+          <a:chExt cx="0" cy="0"/>
+        </a:xfrm>
+      </p:grpSpPr>
+      <p:grpSp>
+        <p:nvGrpSpPr>
+          <p:cNvPr id="7" name="组合 6">
+            <a:extLst>
+              <a:ext uri="{FF2B5EF4-FFF2-40B4-BE49-F238E27FC236}">
+                <a16:creationId xmlns:a16="http://schemas.microsoft.com/office/drawing/2014/main" id="{B4CEF4C7-5048-1622-22E2-283D75270A45}"/>
+              </a:ext>
+            </a:extLst>
+          </p:cNvPr>
+          <p:cNvGrpSpPr/>
+          <p:nvPr/>
+        </p:nvGrpSpPr>
+        <p:grpSpPr>
+          <a:xfrm>
+            <a:off x="1816327" y="547687"/>
+            <a:ext cx="585788" cy="3324225"/>
+            <a:chOff x="5067527" y="2855459"/>
+            <a:chExt cx="585788" cy="3324225"/>
+          </a:xfrm>
+        </p:grpSpPr>
+        <p:pic>
+          <p:nvPicPr>
+            <p:cNvPr id="5" name="图片 4">
+              <a:extLst>
+                <a:ext uri="{FF2B5EF4-FFF2-40B4-BE49-F238E27FC236}">
+                  <a16:creationId xmlns:a16="http://schemas.microsoft.com/office/drawing/2014/main" id="{CD9CFCF3-872B-38CB-C008-A3349510AEF1}"/>
+                </a:ext>
+              </a:extLst>
+            </p:cNvPr>
+            <p:cNvPicPr>
+              <a:picLocks noChangeAspect="1"/>
+            </p:cNvPicPr>
+            <p:nvPr/>
+          </p:nvPicPr>
+          <p:blipFill>
+            <a:blip r:embed="rId2">
+              <a:extLst>
+                <a:ext uri="{28A0092B-C50C-407E-A947-70E740481C1C}">
+                  <a14:useLocalDpi xmlns:a14="http://schemas.microsoft.com/office/drawing/2010/main" val="0"/>
+                </a:ext>
+              </a:extLst>
+            </a:blip>
+            <a:srcRect r="60323"/>
+            <a:stretch/>
+          </p:blipFill>
+          <p:spPr>
+            <a:xfrm>
+              <a:off x="5067527" y="2855459"/>
+              <a:ext cx="585788" cy="3324225"/>
+            </a:xfrm>
+            <a:prstGeom prst="rect">
+              <a:avLst/>
+            </a:prstGeom>
+          </p:spPr>
+        </p:pic>
+        <p:pic>
+          <p:nvPicPr>
+            <p:cNvPr id="6" name="图片 5">
+              <a:extLst>
+                <a:ext uri="{FF2B5EF4-FFF2-40B4-BE49-F238E27FC236}">
+                  <a16:creationId xmlns:a16="http://schemas.microsoft.com/office/drawing/2014/main" id="{A0CFDD7C-7DC2-B4E1-C1DC-F5CD195F5C65}"/>
+                </a:ext>
+              </a:extLst>
+            </p:cNvPr>
+            <p:cNvPicPr>
+              <a:picLocks noChangeAspect="1"/>
+            </p:cNvPicPr>
+            <p:nvPr/>
+          </p:nvPicPr>
+          <p:blipFill>
+            <a:blip r:embed="rId2">
+              <a:clrChange>
+                <a:clrFrom>
+                  <a:srgbClr val="FDFDFD"/>
+                </a:clrFrom>
+                <a:clrTo>
+                  <a:srgbClr val="FDFDFD">
+                    <a:alpha val="0"/>
+                  </a:srgbClr>
+                </a:clrTo>
+              </a:clrChange>
+              <a:extLst>
+                <a:ext uri="{28A0092B-C50C-407E-A947-70E740481C1C}">
+                  <a14:useLocalDpi xmlns:a14="http://schemas.microsoft.com/office/drawing/2010/main" val="0"/>
+                </a:ext>
+              </a:extLst>
+            </a:blip>
+            <a:srcRect l="39679" t="20084" r="19185"/>
+            <a:stretch/>
+          </p:blipFill>
+          <p:spPr>
+            <a:xfrm>
+              <a:off x="5067527" y="2855459"/>
+              <a:ext cx="585788" cy="2656567"/>
+            </a:xfrm>
+            <a:prstGeom prst="rect">
+              <a:avLst/>
+            </a:prstGeom>
+          </p:spPr>
+        </p:pic>
+      </p:grpSp>
+    </p:spTree>
+    <p:extLst>
+      <p:ext uri="{BB962C8B-B14F-4D97-AF65-F5344CB8AC3E}">
+        <p14:creationId xmlns:p14="http://schemas.microsoft.com/office/powerpoint/2010/main" val="799638800"/>
+      </p:ext>
+    </p:extLst>
+  </p:cSld>
+  <p:clrMapOvr>
+    <a:masterClrMapping/>
+  </p:clrMapOvr>
+</p:sld>
+</file>
+
 <file path=ppt/theme/theme1.xml><?xml version="1.0" encoding="utf-8"?>
 <a:theme xmlns:a="http://schemas.openxmlformats.org/drawingml/2006/main" name="Office 主题​​">
   <a:themeElements>

</xml_diff>